<commit_message>
Riadiaca jednotka upravena - vyzera ze synchronizacia odosielania dat funguje - presobeny cely system
</commit_message>
<xml_diff>
--- a/Projekt_3/Projekt 3 prezentácia.pptx
+++ b/Projekt_3/Projekt 3 prezentácia.pptx
@@ -117,6 +117,11 @@
       </a:defRPr>
     </a:lvl9pPr>
   </p:defaultTextStyle>
+  <p:extLst>
+    <p:ext uri="{EFAFB233-063F-42B5-8137-9DF3F51BA10A}">
+      <p15:sldGuideLst xmlns:p15="http://schemas.microsoft.com/office/powerpoint/2012/main"/>
+    </p:ext>
+  </p:extLst>
 </p:presentation>
 </file>
 
@@ -202,7 +207,7 @@
           <a:p>
             <a:fld id="{009D576B-0A58-4062-AB73-DDDC876E5C72}" type="datetimeFigureOut">
               <a:rPr lang="en-US" smtClean="0"/>
-              <a:t>1/31/2019</a:t>
+              <a:t>2/2/2019</a:t>
             </a:fld>
             <a:endParaRPr lang="en-US"/>
           </a:p>
@@ -658,7 +663,7 @@
           <a:p>
             <a:fld id="{BF3B8359-97B6-425D-B39D-BCE2DF18DEBE}" type="datetime1">
               <a:rPr lang="en-US" smtClean="0"/>
-              <a:t>1/31/2019</a:t>
+              <a:t>2/2/2019</a:t>
             </a:fld>
             <a:endParaRPr lang="en-US"/>
           </a:p>
@@ -996,7 +1001,7 @@
           <a:p>
             <a:fld id="{16A1CCC1-6491-4254-AB91-07504A065E1A}" type="datetime1">
               <a:rPr lang="en-US" smtClean="0"/>
-              <a:t>1/31/2019</a:t>
+              <a:t>2/2/2019</a:t>
             </a:fld>
             <a:endParaRPr lang="en-US"/>
           </a:p>
@@ -1397,7 +1402,7 @@
           <a:p>
             <a:fld id="{235F34B4-6E1A-45CC-87E4-F1E981A2550A}" type="datetime1">
               <a:rPr lang="en-US" smtClean="0"/>
-              <a:t>1/31/2019</a:t>
+              <a:t>2/2/2019</a:t>
             </a:fld>
             <a:endParaRPr lang="en-US"/>
           </a:p>
@@ -1733,7 +1738,7 @@
           <a:p>
             <a:fld id="{B24655D2-9227-416D-9043-B490A5362E57}" type="datetime1">
               <a:rPr lang="en-US" smtClean="0"/>
-              <a:t>1/31/2019</a:t>
+              <a:t>2/2/2019</a:t>
             </a:fld>
             <a:endParaRPr lang="en-US"/>
           </a:p>
@@ -2053,7 +2058,7 @@
           <a:p>
             <a:fld id="{6D92C9EC-EF3E-41F2-A638-2599824DBB67}" type="datetime1">
               <a:rPr lang="en-US" smtClean="0"/>
-              <a:t>1/31/2019</a:t>
+              <a:t>2/2/2019</a:t>
             </a:fld>
             <a:endParaRPr lang="en-US"/>
           </a:p>
@@ -2449,7 +2454,7 @@
           <a:p>
             <a:fld id="{6283B1B9-25C4-4457-8860-58525D27F95C}" type="datetime1">
               <a:rPr lang="en-US" smtClean="0"/>
-              <a:t>1/31/2019</a:t>
+              <a:t>2/2/2019</a:t>
             </a:fld>
             <a:endParaRPr lang="en-US"/>
           </a:p>
@@ -2706,7 +2711,7 @@
           <a:p>
             <a:fld id="{FB1D33E3-9E3F-4931-8510-D26533EC7571}" type="datetime1">
               <a:rPr lang="en-US" smtClean="0"/>
-              <a:t>1/31/2019</a:t>
+              <a:t>2/2/2019</a:t>
             </a:fld>
             <a:endParaRPr lang="en-US"/>
           </a:p>
@@ -2968,7 +2973,7 @@
           <a:p>
             <a:fld id="{3968F636-D2DD-4989-9F0D-1A9BFBA25139}" type="datetime1">
               <a:rPr lang="en-US" smtClean="0"/>
-              <a:t>1/31/2019</a:t>
+              <a:t>2/2/2019</a:t>
             </a:fld>
             <a:endParaRPr lang="en-US"/>
           </a:p>
@@ -3230,7 +3235,7 @@
           <a:p>
             <a:fld id="{51140CCA-E2B5-4957-BB11-9DBCD111AE37}" type="datetime1">
               <a:rPr lang="en-US" smtClean="0"/>
-              <a:t>1/31/2019</a:t>
+              <a:t>2/2/2019</a:t>
             </a:fld>
             <a:endParaRPr lang="en-US"/>
           </a:p>
@@ -3559,7 +3564,7 @@
           <a:p>
             <a:fld id="{CE5B6EC5-39A0-41E6-B608-0242DBDBA78A}" type="datetime1">
               <a:rPr lang="en-US" smtClean="0"/>
-              <a:t>1/31/2019</a:t>
+              <a:t>2/2/2019</a:t>
             </a:fld>
             <a:endParaRPr lang="en-US"/>
           </a:p>
@@ -3882,7 +3887,7 @@
           <a:p>
             <a:fld id="{7AC86D6F-761D-42C4-A42A-2329F6239065}" type="datetime1">
               <a:rPr lang="en-US" smtClean="0"/>
-              <a:t>1/31/2019</a:t>
+              <a:t>2/2/2019</a:t>
             </a:fld>
             <a:endParaRPr lang="en-US"/>
           </a:p>
@@ -4339,7 +4344,7 @@
           <a:p>
             <a:fld id="{EFBC7CBA-BDEB-4A85-B12F-D68178C697E9}" type="datetime1">
               <a:rPr lang="en-US" smtClean="0"/>
-              <a:t>1/31/2019</a:t>
+              <a:t>2/2/2019</a:t>
             </a:fld>
             <a:endParaRPr lang="en-US"/>
           </a:p>
@@ -4544,7 +4549,7 @@
           <a:p>
             <a:fld id="{D191058F-76F4-4A08-B259-50A8B45C77EC}" type="datetime1">
               <a:rPr lang="en-US" smtClean="0"/>
-              <a:t>1/31/2019</a:t>
+              <a:t>2/2/2019</a:t>
             </a:fld>
             <a:endParaRPr lang="en-US"/>
           </a:p>
@@ -4721,7 +4726,7 @@
           <a:p>
             <a:fld id="{10FE7839-FE1A-455A-811B-B3C135B42280}" type="datetime1">
               <a:rPr lang="en-US" smtClean="0"/>
-              <a:t>1/31/2019</a:t>
+              <a:t>2/2/2019</a:t>
             </a:fld>
             <a:endParaRPr lang="en-US"/>
           </a:p>
@@ -5054,7 +5059,7 @@
           <a:p>
             <a:fld id="{4935F14E-8481-4154-89C6-20ADBF5430A6}" type="datetime1">
               <a:rPr lang="en-US" smtClean="0"/>
-              <a:t>1/31/2019</a:t>
+              <a:t>2/2/2019</a:t>
             </a:fld>
             <a:endParaRPr lang="en-US"/>
           </a:p>
@@ -5399,7 +5404,7 @@
           <a:p>
             <a:fld id="{AB11E29C-1DB1-4A8D-B015-3FBA13B349DA}" type="datetime1">
               <a:rPr lang="en-US" smtClean="0"/>
-              <a:t>1/31/2019</a:t>
+              <a:t>2/2/2019</a:t>
             </a:fld>
             <a:endParaRPr lang="en-US"/>
           </a:p>
@@ -7516,7 +7521,7 @@
           <a:p>
             <a:fld id="{F26F1D9A-7FED-4FF7-9C9A-427DC0F6D909}" type="datetime1">
               <a:rPr lang="en-US" smtClean="0"/>
-              <a:t>1/31/2019</a:t>
+              <a:t>2/2/2019</a:t>
             </a:fld>
             <a:endParaRPr lang="en-US"/>
           </a:p>
@@ -8554,7 +8559,7 @@
         </p:spPr>
         <p:txBody>
           <a:bodyPr>
-            <a:normAutofit/>
+            <a:normAutofit lnSpcReduction="10000"/>
           </a:bodyPr>
           <a:lstStyle/>
           <a:p>
@@ -8710,7 +8715,7 @@
               </a:rPr>
               <a:t>Studio</a:t>
             </a:r>
-            <a:endParaRPr lang="sk-SK" sz="2000" dirty="0">
+            <a:endParaRPr lang="en-US" sz="2000" dirty="0">
               <a:solidFill>
                 <a:schemeClr val="tx1"/>
               </a:solidFill>
@@ -8722,6 +8727,23 @@
                 </a:outerShdw>
               </a:effectLst>
             </a:endParaRPr>
+          </a:p>
+          <a:p>
+            <a:r>
+              <a:rPr lang="sk-SK" sz="2000" dirty="0">
+                <a:solidFill>
+                  <a:schemeClr val="tx1"/>
+                </a:solidFill>
+                <a:effectLst>
+                  <a:outerShdw blurRad="38100" dist="38100" dir="2700000" algn="tl">
+                    <a:srgbClr val="000000">
+                      <a:alpha val="43137"/>
+                    </a:srgbClr>
+                  </a:outerShdw>
+                </a:effectLst>
+              </a:rPr>
+              <a:t>Doladenie zobrazovania dát na signalizačnej jednotke</a:t>
+            </a:r>
           </a:p>
           <a:p>
             <a:r>

</xml_diff>